<commit_message>
Update UML diagrams and corresponding images
</commit_message>
<xml_diff>
--- a/docs/diagrams/HighLevelSequenceDiagrams.pptx
+++ b/docs/diagrams/HighLevelSequenceDiagrams.pptx
@@ -192,7 +192,7 @@
           <a:p>
             <a:fld id="{F5CC4B3F-88C1-4FFA-B1B6-F41C21DC6924}" type="datetimeFigureOut">
               <a:rPr lang="en-US" smtClean="0"/>
-              <a:t>3/5/2018</a:t>
+              <a:t>3/8/2018</a:t>
             </a:fld>
             <a:endParaRPr lang="en-US"/>
           </a:p>
@@ -641,7 +641,7 @@
           <a:p>
             <a:fld id="{78C97017-6FC3-485B-9764-EAC9E56C1D49}" type="datetimeFigureOut">
               <a:rPr lang="en-US" smtClean="0"/>
-              <a:t>3/5/2018</a:t>
+              <a:t>3/8/2018</a:t>
             </a:fld>
             <a:endParaRPr lang="en-US"/>
           </a:p>
@@ -811,7 +811,7 @@
           <a:p>
             <a:fld id="{78C97017-6FC3-485B-9764-EAC9E56C1D49}" type="datetimeFigureOut">
               <a:rPr lang="en-US" smtClean="0"/>
-              <a:t>3/5/2018</a:t>
+              <a:t>3/8/2018</a:t>
             </a:fld>
             <a:endParaRPr lang="en-US"/>
           </a:p>
@@ -991,7 +991,7 @@
           <a:p>
             <a:fld id="{78C97017-6FC3-485B-9764-EAC9E56C1D49}" type="datetimeFigureOut">
               <a:rPr lang="en-US" smtClean="0"/>
-              <a:t>3/5/2018</a:t>
+              <a:t>3/8/2018</a:t>
             </a:fld>
             <a:endParaRPr lang="en-US"/>
           </a:p>
@@ -1161,7 +1161,7 @@
           <a:p>
             <a:fld id="{78C97017-6FC3-485B-9764-EAC9E56C1D49}" type="datetimeFigureOut">
               <a:rPr lang="en-US" smtClean="0"/>
-              <a:t>3/5/2018</a:t>
+              <a:t>3/8/2018</a:t>
             </a:fld>
             <a:endParaRPr lang="en-US"/>
           </a:p>
@@ -1407,7 +1407,7 @@
           <a:p>
             <a:fld id="{78C97017-6FC3-485B-9764-EAC9E56C1D49}" type="datetimeFigureOut">
               <a:rPr lang="en-US" smtClean="0"/>
-              <a:t>3/5/2018</a:t>
+              <a:t>3/8/2018</a:t>
             </a:fld>
             <a:endParaRPr lang="en-US"/>
           </a:p>
@@ -1695,7 +1695,7 @@
           <a:p>
             <a:fld id="{78C97017-6FC3-485B-9764-EAC9E56C1D49}" type="datetimeFigureOut">
               <a:rPr lang="en-US" smtClean="0"/>
-              <a:t>3/5/2018</a:t>
+              <a:t>3/8/2018</a:t>
             </a:fld>
             <a:endParaRPr lang="en-US"/>
           </a:p>
@@ -2117,7 +2117,7 @@
           <a:p>
             <a:fld id="{78C97017-6FC3-485B-9764-EAC9E56C1D49}" type="datetimeFigureOut">
               <a:rPr lang="en-US" smtClean="0"/>
-              <a:t>3/5/2018</a:t>
+              <a:t>3/8/2018</a:t>
             </a:fld>
             <a:endParaRPr lang="en-US"/>
           </a:p>
@@ -2235,7 +2235,7 @@
           <a:p>
             <a:fld id="{78C97017-6FC3-485B-9764-EAC9E56C1D49}" type="datetimeFigureOut">
               <a:rPr lang="en-US" smtClean="0"/>
-              <a:t>3/5/2018</a:t>
+              <a:t>3/8/2018</a:t>
             </a:fld>
             <a:endParaRPr lang="en-US"/>
           </a:p>
@@ -2330,7 +2330,7 @@
           <a:p>
             <a:fld id="{78C97017-6FC3-485B-9764-EAC9E56C1D49}" type="datetimeFigureOut">
               <a:rPr lang="en-US" smtClean="0"/>
-              <a:t>3/5/2018</a:t>
+              <a:t>3/8/2018</a:t>
             </a:fld>
             <a:endParaRPr lang="en-US"/>
           </a:p>
@@ -2607,7 +2607,7 @@
           <a:p>
             <a:fld id="{78C97017-6FC3-485B-9764-EAC9E56C1D49}" type="datetimeFigureOut">
               <a:rPr lang="en-US" smtClean="0"/>
-              <a:t>3/5/2018</a:t>
+              <a:t>3/8/2018</a:t>
             </a:fld>
             <a:endParaRPr lang="en-US"/>
           </a:p>
@@ -2860,7 +2860,7 @@
           <a:p>
             <a:fld id="{78C97017-6FC3-485B-9764-EAC9E56C1D49}" type="datetimeFigureOut">
               <a:rPr lang="en-US" smtClean="0"/>
-              <a:t>3/5/2018</a:t>
+              <a:t>3/8/2018</a:t>
             </a:fld>
             <a:endParaRPr lang="en-US"/>
           </a:p>
@@ -3073,7 +3073,7 @@
           <a:p>
             <a:fld id="{78C97017-6FC3-485B-9764-EAC9E56C1D49}" type="datetimeFigureOut">
               <a:rPr lang="en-US" smtClean="0"/>
-              <a:t>3/5/2018</a:t>
+              <a:t>3/8/2018</a:t>
             </a:fld>
             <a:endParaRPr lang="en-US"/>
           </a:p>
@@ -4371,7 +4371,7 @@
                   </a:schemeClr>
                 </a:solidFill>
               </a:rPr>
-              <a:t>TaskBookChangedEvent</a:t>
+              <a:t>OrganizerChangedEvent</a:t>
             </a:r>
             <a:r>
               <a:rPr lang="en-US" sz="1400" dirty="0" smtClean="0">
@@ -4946,7 +4946,17 @@
                   </a:schemeClr>
                 </a:solidFill>
               </a:rPr>
-              <a:t>TaskBookChangedEvent</a:t>
+              <a:t>Organizer</a:t>
+            </a:r>
+            <a:r>
+              <a:rPr lang="en-US" sz="1400" dirty="0" err="1" smtClean="0">
+                <a:solidFill>
+                  <a:schemeClr val="accent5">
+                    <a:lumMod val="75000"/>
+                  </a:schemeClr>
+                </a:solidFill>
+              </a:rPr>
+              <a:t>ChangedEvent</a:t>
             </a:r>
             <a:r>
               <a:rPr lang="en-US" sz="1400" dirty="0" smtClean="0">
@@ -5319,7 +5329,7 @@
                   </a:schemeClr>
                 </a:solidFill>
               </a:rPr>
-              <a:t>handleTaskBookChangedEvent</a:t>
+              <a:t>handleOrganizerChangedEvent</a:t>
             </a:r>
             <a:r>
               <a:rPr lang="en-US" sz="1400" dirty="0" smtClean="0">
@@ -5631,7 +5641,7 @@
                   <a:srgbClr val="00B050"/>
                 </a:solidFill>
               </a:rPr>
-              <a:t>handleTaskBookChangedEvent</a:t>
+              <a:t>handleOrganizerChangedEvent</a:t>
             </a:r>
             <a:r>
               <a:rPr lang="en-US" sz="1400" dirty="0" smtClean="0">

</xml_diff>